<commit_message>
Update Mockup : Order Details for Cancelled Order
</commit_message>
<xml_diff>
--- a/doc/Requirements/Order State.pptx
+++ b/doc/Requirements/Order State.pptx
@@ -5721,6 +5721,67 @@
             <a:endParaRPr lang="en-US" sz="1200" b="1" dirty="0">
               <a:solidFill>
                 <a:schemeClr val="bg1"/>
+              </a:solidFill>
+            </a:endParaRPr>
+          </a:p>
+        </p:txBody>
+      </p:sp>
+      <p:sp>
+        <p:nvSpPr>
+          <p:cNvPr id="20" name="TextBox 19"/>
+          <p:cNvSpPr txBox="1"/>
+          <p:nvPr/>
+        </p:nvSpPr>
+        <p:spPr>
+          <a:xfrm>
+            <a:off x="6648281" y="3785242"/>
+            <a:ext cx="5473743" cy="646331"/>
+          </a:xfrm>
+          <a:prstGeom prst="rect">
+            <a:avLst/>
+          </a:prstGeom>
+          <a:noFill/>
+        </p:spPr>
+        <p:txBody>
+          <a:bodyPr wrap="none" rtlCol="0">
+            <a:spAutoFit/>
+          </a:bodyPr>
+          <a:lstStyle/>
+          <a:p>
+            <a:r>
+              <a:rPr lang="en-US" b="1" i="1" dirty="0" smtClean="0">
+                <a:solidFill>
+                  <a:schemeClr val="bg2">
+                    <a:lumMod val="50000"/>
+                  </a:schemeClr>
+                </a:solidFill>
+              </a:rPr>
+              <a:t>When owner cancel the Order, the Order comes back to</a:t>
+            </a:r>
+            <a:br>
+              <a:rPr lang="en-US" b="1" i="1" dirty="0" smtClean="0">
+                <a:solidFill>
+                  <a:schemeClr val="bg2">
+                    <a:lumMod val="50000"/>
+                  </a:schemeClr>
+                </a:solidFill>
+              </a:rPr>
+            </a:br>
+            <a:r>
+              <a:rPr lang="en-US" b="1" i="1" dirty="0" smtClean="0">
+                <a:solidFill>
+                  <a:schemeClr val="bg2">
+                    <a:lumMod val="50000"/>
+                  </a:schemeClr>
+                </a:solidFill>
+              </a:rPr>
+              <a:t>Submitted state, and Accepter is set to None</a:t>
+            </a:r>
+            <a:endParaRPr lang="en-US" b="1" i="1" dirty="0">
+              <a:solidFill>
+                <a:schemeClr val="bg2">
+                  <a:lumMod val="50000"/>
+                </a:schemeClr>
               </a:solidFill>
             </a:endParaRPr>
           </a:p>

</xml_diff>